<commit_message>
Fin de la fiche
</commit_message>
<xml_diff>
--- a/CI_02_AlgorithmiqueProgrammation/01_Introduction/Fiche/images/Figures.pptx
+++ b/CI_02_AlgorithmiqueProgrammation/01_Introduction/Fiche/images/Figures.pptx
@@ -4,8 +4,12 @@
   <p:sldMasterIdLst>
     <p:sldMasterId id="2147483648" r:id="rId1"/>
   </p:sldMasterIdLst>
+  <p:notesMasterIdLst>
+    <p:notesMasterId r:id="rId4"/>
+  </p:notesMasterIdLst>
   <p:sldIdLst>
     <p:sldId id="256" r:id="rId2"/>
+    <p:sldId id="257" r:id="rId3"/>
   </p:sldIdLst>
   <p:sldSz cx="9144000" cy="6858000" type="screen4x3"/>
   <p:notesSz cx="6858000" cy="9144000"/>
@@ -107,6 +111,440 @@
 </p:presentation>
 </file>
 
+<file path=ppt/notesMasters/notesMaster1.xml><?xml version="1.0" encoding="utf-8"?>
+<p:notesMaster xmlns:a="http://schemas.openxmlformats.org/drawingml/2006/main" xmlns:r="http://schemas.openxmlformats.org/officeDocument/2006/relationships" xmlns:p="http://schemas.openxmlformats.org/presentationml/2006/main">
+  <p:cSld>
+    <p:bg>
+      <p:bgRef idx="1001">
+        <a:schemeClr val="bg1"/>
+      </p:bgRef>
+    </p:bg>
+    <p:spTree>
+      <p:nvGrpSpPr>
+        <p:cNvPr id="1" name=""/>
+        <p:cNvGrpSpPr/>
+        <p:nvPr/>
+      </p:nvGrpSpPr>
+      <p:grpSpPr>
+        <a:xfrm>
+          <a:off x="0" y="0"/>
+          <a:ext cx="0" cy="0"/>
+          <a:chOff x="0" y="0"/>
+          <a:chExt cx="0" cy="0"/>
+        </a:xfrm>
+      </p:grpSpPr>
+      <p:sp>
+        <p:nvSpPr>
+          <p:cNvPr id="2" name="Espace réservé de l'en-tête 1"/>
+          <p:cNvSpPr>
+            <a:spLocks noGrp="1"/>
+          </p:cNvSpPr>
+          <p:nvPr>
+            <p:ph type="hdr" sz="quarter"/>
+          </p:nvPr>
+        </p:nvSpPr>
+        <p:spPr>
+          <a:xfrm>
+            <a:off x="0" y="0"/>
+            <a:ext cx="2971800" cy="457200"/>
+          </a:xfrm>
+          <a:prstGeom prst="rect">
+            <a:avLst/>
+          </a:prstGeom>
+        </p:spPr>
+        <p:txBody>
+          <a:bodyPr vert="horz" lIns="91440" tIns="45720" rIns="91440" bIns="45720" rtlCol="0"/>
+          <a:lstStyle>
+            <a:lvl1pPr algn="l">
+              <a:defRPr sz="1200"/>
+            </a:lvl1pPr>
+          </a:lstStyle>
+          <a:p>
+            <a:endParaRPr lang="fr-FR"/>
+          </a:p>
+        </p:txBody>
+      </p:sp>
+      <p:sp>
+        <p:nvSpPr>
+          <p:cNvPr id="3" name="Espace réservé de la date 2"/>
+          <p:cNvSpPr>
+            <a:spLocks noGrp="1"/>
+          </p:cNvSpPr>
+          <p:nvPr>
+            <p:ph type="dt" idx="1"/>
+          </p:nvPr>
+        </p:nvSpPr>
+        <p:spPr>
+          <a:xfrm>
+            <a:off x="3884613" y="0"/>
+            <a:ext cx="2971800" cy="457200"/>
+          </a:xfrm>
+          <a:prstGeom prst="rect">
+            <a:avLst/>
+          </a:prstGeom>
+        </p:spPr>
+        <p:txBody>
+          <a:bodyPr vert="horz" lIns="91440" tIns="45720" rIns="91440" bIns="45720" rtlCol="0"/>
+          <a:lstStyle>
+            <a:lvl1pPr algn="r">
+              <a:defRPr sz="1200"/>
+            </a:lvl1pPr>
+          </a:lstStyle>
+          <a:p>
+            <a:fld id="{A03AE690-8A44-44A6-BFFB-08491F93A799}" type="datetimeFigureOut">
+              <a:rPr lang="fr-FR" smtClean="0"/>
+              <a:t>28/06/2015</a:t>
+            </a:fld>
+            <a:endParaRPr lang="fr-FR"/>
+          </a:p>
+        </p:txBody>
+      </p:sp>
+      <p:sp>
+        <p:nvSpPr>
+          <p:cNvPr id="4" name="Espace réservé de l'image des diapositives 3"/>
+          <p:cNvSpPr>
+            <a:spLocks noGrp="1" noRot="1" noChangeAspect="1"/>
+          </p:cNvSpPr>
+          <p:nvPr>
+            <p:ph type="sldImg" idx="2"/>
+          </p:nvPr>
+        </p:nvSpPr>
+        <p:spPr>
+          <a:xfrm>
+            <a:off x="1143000" y="685800"/>
+            <a:ext cx="4572000" cy="3429000"/>
+          </a:xfrm>
+          <a:prstGeom prst="rect">
+            <a:avLst/>
+          </a:prstGeom>
+          <a:noFill/>
+          <a:ln w="12700">
+            <a:solidFill>
+              <a:prstClr val="black"/>
+            </a:solidFill>
+          </a:ln>
+        </p:spPr>
+        <p:txBody>
+          <a:bodyPr vert="horz" lIns="91440" tIns="45720" rIns="91440" bIns="45720" rtlCol="0" anchor="ctr"/>
+          <a:lstStyle/>
+          <a:p>
+            <a:endParaRPr lang="fr-FR"/>
+          </a:p>
+        </p:txBody>
+      </p:sp>
+      <p:sp>
+        <p:nvSpPr>
+          <p:cNvPr id="5" name="Espace réservé des commentaires 4"/>
+          <p:cNvSpPr>
+            <a:spLocks noGrp="1"/>
+          </p:cNvSpPr>
+          <p:nvPr>
+            <p:ph type="body" sz="quarter" idx="3"/>
+          </p:nvPr>
+        </p:nvSpPr>
+        <p:spPr>
+          <a:xfrm>
+            <a:off x="685800" y="4343400"/>
+            <a:ext cx="5486400" cy="4114800"/>
+          </a:xfrm>
+          <a:prstGeom prst="rect">
+            <a:avLst/>
+          </a:prstGeom>
+        </p:spPr>
+        <p:txBody>
+          <a:bodyPr vert="horz" lIns="91440" tIns="45720" rIns="91440" bIns="45720" rtlCol="0"/>
+          <a:lstStyle/>
+          <a:p>
+            <a:pPr lvl="0"/>
+            <a:r>
+              <a:rPr lang="fr-FR" smtClean="0"/>
+              <a:t>Modifiez les styles du texte du masque</a:t>
+            </a:r>
+          </a:p>
+          <a:p>
+            <a:pPr lvl="1"/>
+            <a:r>
+              <a:rPr lang="fr-FR" smtClean="0"/>
+              <a:t>Deuxième niveau</a:t>
+            </a:r>
+          </a:p>
+          <a:p>
+            <a:pPr lvl="2"/>
+            <a:r>
+              <a:rPr lang="fr-FR" smtClean="0"/>
+              <a:t>Troisième niveau</a:t>
+            </a:r>
+          </a:p>
+          <a:p>
+            <a:pPr lvl="3"/>
+            <a:r>
+              <a:rPr lang="fr-FR" smtClean="0"/>
+              <a:t>Quatrième niveau</a:t>
+            </a:r>
+          </a:p>
+          <a:p>
+            <a:pPr lvl="4"/>
+            <a:r>
+              <a:rPr lang="fr-FR" smtClean="0"/>
+              <a:t>Cinquième niveau</a:t>
+            </a:r>
+            <a:endParaRPr lang="fr-FR"/>
+          </a:p>
+        </p:txBody>
+      </p:sp>
+      <p:sp>
+        <p:nvSpPr>
+          <p:cNvPr id="6" name="Espace réservé du pied de page 5"/>
+          <p:cNvSpPr>
+            <a:spLocks noGrp="1"/>
+          </p:cNvSpPr>
+          <p:nvPr>
+            <p:ph type="ftr" sz="quarter" idx="4"/>
+          </p:nvPr>
+        </p:nvSpPr>
+        <p:spPr>
+          <a:xfrm>
+            <a:off x="0" y="8685213"/>
+            <a:ext cx="2971800" cy="457200"/>
+          </a:xfrm>
+          <a:prstGeom prst="rect">
+            <a:avLst/>
+          </a:prstGeom>
+        </p:spPr>
+        <p:txBody>
+          <a:bodyPr vert="horz" lIns="91440" tIns="45720" rIns="91440" bIns="45720" rtlCol="0" anchor="b"/>
+          <a:lstStyle>
+            <a:lvl1pPr algn="l">
+              <a:defRPr sz="1200"/>
+            </a:lvl1pPr>
+          </a:lstStyle>
+          <a:p>
+            <a:endParaRPr lang="fr-FR"/>
+          </a:p>
+        </p:txBody>
+      </p:sp>
+      <p:sp>
+        <p:nvSpPr>
+          <p:cNvPr id="7" name="Espace réservé du numéro de diapositive 6"/>
+          <p:cNvSpPr>
+            <a:spLocks noGrp="1"/>
+          </p:cNvSpPr>
+          <p:nvPr>
+            <p:ph type="sldNum" sz="quarter" idx="5"/>
+          </p:nvPr>
+        </p:nvSpPr>
+        <p:spPr>
+          <a:xfrm>
+            <a:off x="3884613" y="8685213"/>
+            <a:ext cx="2971800" cy="457200"/>
+          </a:xfrm>
+          <a:prstGeom prst="rect">
+            <a:avLst/>
+          </a:prstGeom>
+        </p:spPr>
+        <p:txBody>
+          <a:bodyPr vert="horz" lIns="91440" tIns="45720" rIns="91440" bIns="45720" rtlCol="0" anchor="b"/>
+          <a:lstStyle>
+            <a:lvl1pPr algn="r">
+              <a:defRPr sz="1200"/>
+            </a:lvl1pPr>
+          </a:lstStyle>
+          <a:p>
+            <a:fld id="{47670821-391E-459C-90B4-2BF81C8BDE2C}" type="slidenum">
+              <a:rPr lang="fr-FR" smtClean="0"/>
+              <a:t>‹N°›</a:t>
+            </a:fld>
+            <a:endParaRPr lang="fr-FR"/>
+          </a:p>
+        </p:txBody>
+      </p:sp>
+    </p:spTree>
+    <p:extLst>
+      <p:ext uri="{BB962C8B-B14F-4D97-AF65-F5344CB8AC3E}">
+        <p14:creationId xmlns:p14="http://schemas.microsoft.com/office/powerpoint/2010/main" val="3274791229"/>
+      </p:ext>
+    </p:extLst>
+  </p:cSld>
+  <p:clrMap bg1="lt1" tx1="dk1" bg2="lt2" tx2="dk2" accent1="accent1" accent2="accent2" accent3="accent3" accent4="accent4" accent5="accent5" accent6="accent6" hlink="hlink" folHlink="folHlink"/>
+  <p:notesStyle>
+    <a:lvl1pPr marL="0" algn="l" defTabSz="914400" rtl="0" eaLnBrk="1" latinLnBrk="0" hangingPunct="1">
+      <a:defRPr sz="1200" kern="1200">
+        <a:solidFill>
+          <a:schemeClr val="tx1"/>
+        </a:solidFill>
+        <a:latin typeface="+mn-lt"/>
+        <a:ea typeface="+mn-ea"/>
+        <a:cs typeface="+mn-cs"/>
+      </a:defRPr>
+    </a:lvl1pPr>
+    <a:lvl2pPr marL="457200" algn="l" defTabSz="914400" rtl="0" eaLnBrk="1" latinLnBrk="0" hangingPunct="1">
+      <a:defRPr sz="1200" kern="1200">
+        <a:solidFill>
+          <a:schemeClr val="tx1"/>
+        </a:solidFill>
+        <a:latin typeface="+mn-lt"/>
+        <a:ea typeface="+mn-ea"/>
+        <a:cs typeface="+mn-cs"/>
+      </a:defRPr>
+    </a:lvl2pPr>
+    <a:lvl3pPr marL="914400" algn="l" defTabSz="914400" rtl="0" eaLnBrk="1" latinLnBrk="0" hangingPunct="1">
+      <a:defRPr sz="1200" kern="1200">
+        <a:solidFill>
+          <a:schemeClr val="tx1"/>
+        </a:solidFill>
+        <a:latin typeface="+mn-lt"/>
+        <a:ea typeface="+mn-ea"/>
+        <a:cs typeface="+mn-cs"/>
+      </a:defRPr>
+    </a:lvl3pPr>
+    <a:lvl4pPr marL="1371600" algn="l" defTabSz="914400" rtl="0" eaLnBrk="1" latinLnBrk="0" hangingPunct="1">
+      <a:defRPr sz="1200" kern="1200">
+        <a:solidFill>
+          <a:schemeClr val="tx1"/>
+        </a:solidFill>
+        <a:latin typeface="+mn-lt"/>
+        <a:ea typeface="+mn-ea"/>
+        <a:cs typeface="+mn-cs"/>
+      </a:defRPr>
+    </a:lvl4pPr>
+    <a:lvl5pPr marL="1828800" algn="l" defTabSz="914400" rtl="0" eaLnBrk="1" latinLnBrk="0" hangingPunct="1">
+      <a:defRPr sz="1200" kern="1200">
+        <a:solidFill>
+          <a:schemeClr val="tx1"/>
+        </a:solidFill>
+        <a:latin typeface="+mn-lt"/>
+        <a:ea typeface="+mn-ea"/>
+        <a:cs typeface="+mn-cs"/>
+      </a:defRPr>
+    </a:lvl5pPr>
+    <a:lvl6pPr marL="2286000" algn="l" defTabSz="914400" rtl="0" eaLnBrk="1" latinLnBrk="0" hangingPunct="1">
+      <a:defRPr sz="1200" kern="1200">
+        <a:solidFill>
+          <a:schemeClr val="tx1"/>
+        </a:solidFill>
+        <a:latin typeface="+mn-lt"/>
+        <a:ea typeface="+mn-ea"/>
+        <a:cs typeface="+mn-cs"/>
+      </a:defRPr>
+    </a:lvl6pPr>
+    <a:lvl7pPr marL="2743200" algn="l" defTabSz="914400" rtl="0" eaLnBrk="1" latinLnBrk="0" hangingPunct="1">
+      <a:defRPr sz="1200" kern="1200">
+        <a:solidFill>
+          <a:schemeClr val="tx1"/>
+        </a:solidFill>
+        <a:latin typeface="+mn-lt"/>
+        <a:ea typeface="+mn-ea"/>
+        <a:cs typeface="+mn-cs"/>
+      </a:defRPr>
+    </a:lvl7pPr>
+    <a:lvl8pPr marL="3200400" algn="l" defTabSz="914400" rtl="0" eaLnBrk="1" latinLnBrk="0" hangingPunct="1">
+      <a:defRPr sz="1200" kern="1200">
+        <a:solidFill>
+          <a:schemeClr val="tx1"/>
+        </a:solidFill>
+        <a:latin typeface="+mn-lt"/>
+        <a:ea typeface="+mn-ea"/>
+        <a:cs typeface="+mn-cs"/>
+      </a:defRPr>
+    </a:lvl8pPr>
+    <a:lvl9pPr marL="3657600" algn="l" defTabSz="914400" rtl="0" eaLnBrk="1" latinLnBrk="0" hangingPunct="1">
+      <a:defRPr sz="1200" kern="1200">
+        <a:solidFill>
+          <a:schemeClr val="tx1"/>
+        </a:solidFill>
+        <a:latin typeface="+mn-lt"/>
+        <a:ea typeface="+mn-ea"/>
+        <a:cs typeface="+mn-cs"/>
+      </a:defRPr>
+    </a:lvl9pPr>
+  </p:notesStyle>
+</p:notesMaster>
+</file>
+
+<file path=ppt/notesSlides/notesSlide1.xml><?xml version="1.0" encoding="utf-8"?>
+<p:notes xmlns:a="http://schemas.openxmlformats.org/drawingml/2006/main" xmlns:r="http://schemas.openxmlformats.org/officeDocument/2006/relationships" xmlns:p="http://schemas.openxmlformats.org/presentationml/2006/main">
+  <p:cSld>
+    <p:spTree>
+      <p:nvGrpSpPr>
+        <p:cNvPr id="1" name=""/>
+        <p:cNvGrpSpPr/>
+        <p:nvPr/>
+      </p:nvGrpSpPr>
+      <p:grpSpPr>
+        <a:xfrm>
+          <a:off x="0" y="0"/>
+          <a:ext cx="0" cy="0"/>
+          <a:chOff x="0" y="0"/>
+          <a:chExt cx="0" cy="0"/>
+        </a:xfrm>
+      </p:grpSpPr>
+      <p:sp>
+        <p:nvSpPr>
+          <p:cNvPr id="2" name="Espace réservé de l'image des diapositives 1"/>
+          <p:cNvSpPr>
+            <a:spLocks noGrp="1" noRot="1" noChangeAspect="1"/>
+          </p:cNvSpPr>
+          <p:nvPr>
+            <p:ph type="sldImg"/>
+          </p:nvPr>
+        </p:nvSpPr>
+        <p:spPr/>
+      </p:sp>
+      <p:sp>
+        <p:nvSpPr>
+          <p:cNvPr id="3" name="Espace réservé des commentaires 2"/>
+          <p:cNvSpPr>
+            <a:spLocks noGrp="1"/>
+          </p:cNvSpPr>
+          <p:nvPr>
+            <p:ph type="body" idx="1"/>
+          </p:nvPr>
+        </p:nvSpPr>
+        <p:spPr/>
+        <p:txBody>
+          <a:bodyPr/>
+          <a:lstStyle/>
+          <a:p>
+            <a:endParaRPr lang="fr-FR" dirty="0"/>
+          </a:p>
+        </p:txBody>
+      </p:sp>
+      <p:sp>
+        <p:nvSpPr>
+          <p:cNvPr id="4" name="Espace réservé du numéro de diapositive 3"/>
+          <p:cNvSpPr>
+            <a:spLocks noGrp="1"/>
+          </p:cNvSpPr>
+          <p:nvPr>
+            <p:ph type="sldNum" sz="quarter" idx="10"/>
+          </p:nvPr>
+        </p:nvSpPr>
+        <p:spPr/>
+        <p:txBody>
+          <a:bodyPr/>
+          <a:lstStyle/>
+          <a:p>
+            <a:fld id="{47670821-391E-459C-90B4-2BF81C8BDE2C}" type="slidenum">
+              <a:rPr lang="fr-FR" smtClean="0"/>
+              <a:t>2</a:t>
+            </a:fld>
+            <a:endParaRPr lang="fr-FR"/>
+          </a:p>
+        </p:txBody>
+      </p:sp>
+    </p:spTree>
+    <p:extLst>
+      <p:ext uri="{BB962C8B-B14F-4D97-AF65-F5344CB8AC3E}">
+        <p14:creationId xmlns:p14="http://schemas.microsoft.com/office/powerpoint/2010/main" val="254347980"/>
+      </p:ext>
+    </p:extLst>
+  </p:cSld>
+  <p:clrMapOvr>
+    <a:masterClrMapping/>
+  </p:clrMapOvr>
+</p:notes>
+</file>
+
 <file path=ppt/slideLayouts/slideLayout1.xml><?xml version="1.0" encoding="utf-8"?>
 <p:sldLayout xmlns:a="http://schemas.openxmlformats.org/drawingml/2006/main" xmlns:r="http://schemas.openxmlformats.org/officeDocument/2006/relationships" xmlns:p="http://schemas.openxmlformats.org/presentationml/2006/main" type="title" preserve="1">
   <p:cSld name="Diapositive de titre">
@@ -288,7 +726,7 @@
           <a:p>
             <a:fld id="{AA309A6D-C09C-4548-B29A-6CF363A7E532}" type="datetimeFigureOut">
               <a:rPr lang="fr-FR" smtClean="0"/>
-              <a:t>27/06/2015</a:t>
+              <a:t>28/06/2015</a:t>
             </a:fld>
             <a:endParaRPr lang="fr-BE"/>
           </a:p>
@@ -453,7 +891,7 @@
           <a:p>
             <a:fld id="{AA309A6D-C09C-4548-B29A-6CF363A7E532}" type="datetimeFigureOut">
               <a:rPr lang="fr-FR" smtClean="0"/>
-              <a:t>27/06/2015</a:t>
+              <a:t>28/06/2015</a:t>
             </a:fld>
             <a:endParaRPr lang="fr-BE"/>
           </a:p>
@@ -628,7 +1066,7 @@
           <a:p>
             <a:fld id="{AA309A6D-C09C-4548-B29A-6CF363A7E532}" type="datetimeFigureOut">
               <a:rPr lang="fr-FR" smtClean="0"/>
-              <a:t>27/06/2015</a:t>
+              <a:t>28/06/2015</a:t>
             </a:fld>
             <a:endParaRPr lang="fr-BE"/>
           </a:p>
@@ -793,7 +1231,7 @@
           <a:p>
             <a:fld id="{AA309A6D-C09C-4548-B29A-6CF363A7E532}" type="datetimeFigureOut">
               <a:rPr lang="fr-FR" smtClean="0"/>
-              <a:t>27/06/2015</a:t>
+              <a:t>28/06/2015</a:t>
             </a:fld>
             <a:endParaRPr lang="fr-BE"/>
           </a:p>
@@ -1034,7 +1472,7 @@
           <a:p>
             <a:fld id="{AA309A6D-C09C-4548-B29A-6CF363A7E532}" type="datetimeFigureOut">
               <a:rPr lang="fr-FR" smtClean="0"/>
-              <a:t>27/06/2015</a:t>
+              <a:t>28/06/2015</a:t>
             </a:fld>
             <a:endParaRPr lang="fr-BE"/>
           </a:p>
@@ -1317,7 +1755,7 @@
           <a:p>
             <a:fld id="{AA309A6D-C09C-4548-B29A-6CF363A7E532}" type="datetimeFigureOut">
               <a:rPr lang="fr-FR" smtClean="0"/>
-              <a:t>27/06/2015</a:t>
+              <a:t>28/06/2015</a:t>
             </a:fld>
             <a:endParaRPr lang="fr-BE"/>
           </a:p>
@@ -1734,7 +2172,7 @@
           <a:p>
             <a:fld id="{AA309A6D-C09C-4548-B29A-6CF363A7E532}" type="datetimeFigureOut">
               <a:rPr lang="fr-FR" smtClean="0"/>
-              <a:t>27/06/2015</a:t>
+              <a:t>28/06/2015</a:t>
             </a:fld>
             <a:endParaRPr lang="fr-BE"/>
           </a:p>
@@ -1847,7 +2285,7 @@
           <a:p>
             <a:fld id="{AA309A6D-C09C-4548-B29A-6CF363A7E532}" type="datetimeFigureOut">
               <a:rPr lang="fr-FR" smtClean="0"/>
-              <a:t>27/06/2015</a:t>
+              <a:t>28/06/2015</a:t>
             </a:fld>
             <a:endParaRPr lang="fr-BE"/>
           </a:p>
@@ -1937,7 +2375,7 @@
           <a:p>
             <a:fld id="{AA309A6D-C09C-4548-B29A-6CF363A7E532}" type="datetimeFigureOut">
               <a:rPr lang="fr-FR" smtClean="0"/>
-              <a:t>27/06/2015</a:t>
+              <a:t>28/06/2015</a:t>
             </a:fld>
             <a:endParaRPr lang="fr-BE"/>
           </a:p>
@@ -2209,7 +2647,7 @@
           <a:p>
             <a:fld id="{AA309A6D-C09C-4548-B29A-6CF363A7E532}" type="datetimeFigureOut">
               <a:rPr lang="fr-FR" smtClean="0"/>
-              <a:t>27/06/2015</a:t>
+              <a:t>28/06/2015</a:t>
             </a:fld>
             <a:endParaRPr lang="fr-BE"/>
           </a:p>
@@ -2457,7 +2895,7 @@
           <a:p>
             <a:fld id="{AA309A6D-C09C-4548-B29A-6CF363A7E532}" type="datetimeFigureOut">
               <a:rPr lang="fr-FR" smtClean="0"/>
-              <a:t>27/06/2015</a:t>
+              <a:t>28/06/2015</a:t>
             </a:fld>
             <a:endParaRPr lang="fr-BE"/>
           </a:p>
@@ -2665,7 +3103,7 @@
           <a:p>
             <a:fld id="{AA309A6D-C09C-4548-B29A-6CF363A7E532}" type="datetimeFigureOut">
               <a:rPr lang="fr-FR" smtClean="0"/>
-              <a:t>27/06/2015</a:t>
+              <a:t>28/06/2015</a:t>
             </a:fld>
             <a:endParaRPr lang="fr-BE"/>
           </a:p>
@@ -3950,6 +4388,1124 @@
 </p:sld>
 </file>
 
+<file path=ppt/slides/slide2.xml><?xml version="1.0" encoding="utf-8"?>
+<p:sld xmlns:a="http://schemas.openxmlformats.org/drawingml/2006/main" xmlns:r="http://schemas.openxmlformats.org/officeDocument/2006/relationships" xmlns:p="http://schemas.openxmlformats.org/presentationml/2006/main">
+  <p:cSld>
+    <p:spTree>
+      <p:nvGrpSpPr>
+        <p:cNvPr id="1" name=""/>
+        <p:cNvGrpSpPr/>
+        <p:nvPr/>
+      </p:nvGrpSpPr>
+      <p:grpSpPr>
+        <a:xfrm>
+          <a:off x="0" y="0"/>
+          <a:ext cx="0" cy="0"/>
+          <a:chOff x="0" y="0"/>
+          <a:chExt cx="0" cy="0"/>
+        </a:xfrm>
+      </p:grpSpPr>
+      <p:pic>
+        <p:nvPicPr>
+          <p:cNvPr id="1028" name="Picture 4"/>
+          <p:cNvPicPr>
+            <a:picLocks noChangeAspect="1" noChangeArrowheads="1"/>
+          </p:cNvPicPr>
+          <p:nvPr/>
+        </p:nvPicPr>
+        <p:blipFill rotWithShape="1">
+          <a:blip r:embed="rId3">
+            <a:extLst>
+              <a:ext uri="{28A0092B-C50C-407E-A947-70E740481C1C}">
+                <a14:useLocalDpi xmlns:a14="http://schemas.microsoft.com/office/drawing/2010/main" val="0"/>
+              </a:ext>
+            </a:extLst>
+          </a:blip>
+          <a:srcRect t="28125" r="51278" b="32500"/>
+          <a:stretch/>
+        </p:blipFill>
+        <p:spPr bwMode="auto">
+          <a:xfrm>
+            <a:off x="-1525918" y="1052166"/>
+            <a:ext cx="6339320" cy="2880360"/>
+          </a:xfrm>
+          <a:prstGeom prst="rect">
+            <a:avLst/>
+          </a:prstGeom>
+          <a:noFill/>
+          <a:ln>
+            <a:noFill/>
+          </a:ln>
+          <a:effectLst/>
+          <a:extLst>
+            <a:ext uri="{909E8E84-426E-40DD-AFC4-6F175D3DCCD1}">
+              <a14:hiddenFill xmlns:a14="http://schemas.microsoft.com/office/drawing/2010/main">
+                <a:solidFill>
+                  <a:schemeClr val="accent1"/>
+                </a:solidFill>
+              </a14:hiddenFill>
+            </a:ext>
+            <a:ext uri="{91240B29-F687-4F45-9708-019B960494DF}">
+              <a14:hiddenLine xmlns:a14="http://schemas.microsoft.com/office/drawing/2010/main" w="9525">
+                <a:solidFill>
+                  <a:schemeClr val="tx1"/>
+                </a:solidFill>
+                <a:miter lim="800000"/>
+                <a:headEnd/>
+                <a:tailEnd/>
+              </a14:hiddenLine>
+            </a:ext>
+            <a:ext uri="{AF507438-7753-43E0-B8FC-AC1667EBCBE1}">
+              <a14:hiddenEffects xmlns:a14="http://schemas.microsoft.com/office/drawing/2010/main">
+                <a:effectLst>
+                  <a:outerShdw dist="35921" dir="2700000" algn="ctr" rotWithShape="0">
+                    <a:schemeClr val="bg2"/>
+                  </a:outerShdw>
+                </a:effectLst>
+              </a14:hiddenEffects>
+            </a:ext>
+          </a:extLst>
+        </p:spPr>
+      </p:pic>
+      <p:sp>
+        <p:nvSpPr>
+          <p:cNvPr id="4" name="Rectangle 3"/>
+          <p:cNvSpPr/>
+          <p:nvPr/>
+        </p:nvSpPr>
+        <p:spPr>
+          <a:xfrm>
+            <a:off x="-1100048" y="2047922"/>
+            <a:ext cx="2160240" cy="576064"/>
+          </a:xfrm>
+          <a:prstGeom prst="rect">
+            <a:avLst/>
+          </a:prstGeom>
+          <a:noFill/>
+          <a:ln>
+            <a:solidFill>
+              <a:srgbClr val="FF0000"/>
+            </a:solidFill>
+            <a:prstDash val="dash"/>
+          </a:ln>
+        </p:spPr>
+        <p:style>
+          <a:lnRef idx="2">
+            <a:schemeClr val="accent1">
+              <a:shade val="50000"/>
+            </a:schemeClr>
+          </a:lnRef>
+          <a:fillRef idx="1">
+            <a:schemeClr val="accent1"/>
+          </a:fillRef>
+          <a:effectRef idx="0">
+            <a:schemeClr val="accent1"/>
+          </a:effectRef>
+          <a:fontRef idx="minor">
+            <a:schemeClr val="lt1"/>
+          </a:fontRef>
+        </p:style>
+        <p:txBody>
+          <a:bodyPr rtlCol="0" anchor="ctr"/>
+          <a:lstStyle/>
+          <a:p>
+            <a:pPr algn="ctr"/>
+            <a:endParaRPr lang="fr-FR" sz="1600"/>
+          </a:p>
+        </p:txBody>
+      </p:sp>
+      <p:sp>
+        <p:nvSpPr>
+          <p:cNvPr id="8" name="Rectangle 7"/>
+          <p:cNvSpPr/>
+          <p:nvPr/>
+        </p:nvSpPr>
+        <p:spPr>
+          <a:xfrm>
+            <a:off x="-1097856" y="2772852"/>
+            <a:ext cx="2160240" cy="288032"/>
+          </a:xfrm>
+          <a:prstGeom prst="rect">
+            <a:avLst/>
+          </a:prstGeom>
+          <a:noFill/>
+          <a:ln>
+            <a:solidFill>
+              <a:srgbClr val="0070C0"/>
+            </a:solidFill>
+            <a:prstDash val="dash"/>
+          </a:ln>
+        </p:spPr>
+        <p:style>
+          <a:lnRef idx="2">
+            <a:schemeClr val="accent1">
+              <a:shade val="50000"/>
+            </a:schemeClr>
+          </a:lnRef>
+          <a:fillRef idx="1">
+            <a:schemeClr val="accent1"/>
+          </a:fillRef>
+          <a:effectRef idx="0">
+            <a:schemeClr val="accent1"/>
+          </a:effectRef>
+          <a:fontRef idx="minor">
+            <a:schemeClr val="lt1"/>
+          </a:fontRef>
+        </p:style>
+        <p:txBody>
+          <a:bodyPr rtlCol="0" anchor="ctr"/>
+          <a:lstStyle/>
+          <a:p>
+            <a:pPr algn="ctr"/>
+            <a:endParaRPr lang="fr-FR" sz="1600"/>
+          </a:p>
+        </p:txBody>
+      </p:sp>
+      <p:sp>
+        <p:nvSpPr>
+          <p:cNvPr id="5" name="ZoneTexte 4"/>
+          <p:cNvSpPr txBox="1"/>
+          <p:nvPr/>
+        </p:nvSpPr>
+        <p:spPr>
+          <a:xfrm>
+            <a:off x="1712169" y="1674771"/>
+            <a:ext cx="3347519" cy="338554"/>
+          </a:xfrm>
+          <a:prstGeom prst="rect">
+            <a:avLst/>
+          </a:prstGeom>
+          <a:noFill/>
+        </p:spPr>
+        <p:txBody>
+          <a:bodyPr wrap="none" rtlCol="0">
+            <a:spAutoFit/>
+          </a:bodyPr>
+          <a:lstStyle/>
+          <a:p>
+            <a:r>
+              <a:rPr lang="fr-FR" sz="1600" b="1" dirty="0" smtClean="0">
+                <a:solidFill>
+                  <a:srgbClr val="FF0000"/>
+                </a:solidFill>
+              </a:rPr>
+              <a:t>Import de bibliothèques de </a:t>
+            </a:r>
+            <a:r>
+              <a:rPr lang="fr-FR" sz="1600" b="1" dirty="0" smtClean="0">
+                <a:solidFill>
+                  <a:srgbClr val="FF0000"/>
+                </a:solidFill>
+              </a:rPr>
+              <a:t>fonctions</a:t>
+            </a:r>
+            <a:endParaRPr lang="fr-FR" sz="1600" b="1" dirty="0">
+              <a:solidFill>
+                <a:srgbClr val="FF0000"/>
+              </a:solidFill>
+            </a:endParaRPr>
+          </a:p>
+        </p:txBody>
+      </p:sp>
+      <p:cxnSp>
+        <p:nvCxnSpPr>
+          <p:cNvPr id="7" name="Connecteur droit avec flèche 6"/>
+          <p:cNvCxnSpPr>
+            <a:stCxn id="5" idx="1"/>
+            <a:endCxn id="4" idx="3"/>
+          </p:cNvCxnSpPr>
+          <p:nvPr/>
+        </p:nvCxnSpPr>
+        <p:spPr>
+          <a:xfrm flipH="1">
+            <a:off x="1060192" y="1844048"/>
+            <a:ext cx="651977" cy="491906"/>
+          </a:xfrm>
+          <a:prstGeom prst="straightConnector1">
+            <a:avLst/>
+          </a:prstGeom>
+          <a:ln w="28575">
+            <a:solidFill>
+              <a:srgbClr val="FF0000"/>
+            </a:solidFill>
+            <a:tailEnd type="stealth" w="med" len="lg"/>
+          </a:ln>
+        </p:spPr>
+        <p:style>
+          <a:lnRef idx="1">
+            <a:schemeClr val="accent1"/>
+          </a:lnRef>
+          <a:fillRef idx="0">
+            <a:schemeClr val="accent1"/>
+          </a:fillRef>
+          <a:effectRef idx="0">
+            <a:schemeClr val="accent1"/>
+          </a:effectRef>
+          <a:fontRef idx="minor">
+            <a:schemeClr val="tx1"/>
+          </a:fontRef>
+        </p:style>
+      </p:cxnSp>
+      <p:cxnSp>
+        <p:nvCxnSpPr>
+          <p:cNvPr id="13" name="Connecteur droit avec flèche 12"/>
+          <p:cNvCxnSpPr/>
+          <p:nvPr/>
+        </p:nvCxnSpPr>
+        <p:spPr>
+          <a:xfrm flipH="1">
+            <a:off x="1062385" y="2686536"/>
+            <a:ext cx="1740657" cy="86316"/>
+          </a:xfrm>
+          <a:prstGeom prst="straightConnector1">
+            <a:avLst/>
+          </a:prstGeom>
+          <a:noFill/>
+          <a:ln>
+            <a:solidFill>
+              <a:srgbClr val="0070C0"/>
+            </a:solidFill>
+            <a:prstDash val="dash"/>
+          </a:ln>
+        </p:spPr>
+        <p:style>
+          <a:lnRef idx="2">
+            <a:schemeClr val="accent1">
+              <a:shade val="50000"/>
+            </a:schemeClr>
+          </a:lnRef>
+          <a:fillRef idx="1">
+            <a:schemeClr val="accent1"/>
+          </a:fillRef>
+          <a:effectRef idx="0">
+            <a:schemeClr val="accent1"/>
+          </a:effectRef>
+          <a:fontRef idx="minor">
+            <a:schemeClr val="lt1"/>
+          </a:fontRef>
+        </p:style>
+      </p:cxnSp>
+      <p:sp>
+        <p:nvSpPr>
+          <p:cNvPr id="16" name="Rectangle 15"/>
+          <p:cNvSpPr/>
+          <p:nvPr/>
+        </p:nvSpPr>
+        <p:spPr>
+          <a:xfrm>
+            <a:off x="418298" y="1071871"/>
+            <a:ext cx="1152128" cy="340335"/>
+          </a:xfrm>
+          <a:prstGeom prst="rect">
+            <a:avLst/>
+          </a:prstGeom>
+          <a:noFill/>
+          <a:ln>
+            <a:solidFill>
+              <a:srgbClr val="FF0000"/>
+            </a:solidFill>
+            <a:prstDash val="dash"/>
+          </a:ln>
+        </p:spPr>
+        <p:style>
+          <a:lnRef idx="2">
+            <a:schemeClr val="accent1">
+              <a:shade val="50000"/>
+            </a:schemeClr>
+          </a:lnRef>
+          <a:fillRef idx="1">
+            <a:schemeClr val="accent1"/>
+          </a:fillRef>
+          <a:effectRef idx="0">
+            <a:schemeClr val="accent1"/>
+          </a:effectRef>
+          <a:fontRef idx="minor">
+            <a:schemeClr val="lt1"/>
+          </a:fontRef>
+        </p:style>
+        <p:txBody>
+          <a:bodyPr rtlCol="0" anchor="ctr"/>
+          <a:lstStyle/>
+          <a:p>
+            <a:pPr algn="ctr"/>
+            <a:endParaRPr lang="fr-FR" sz="1600"/>
+          </a:p>
+        </p:txBody>
+      </p:sp>
+      <p:cxnSp>
+        <p:nvCxnSpPr>
+          <p:cNvPr id="17" name="Connecteur droit avec flèche 16"/>
+          <p:cNvCxnSpPr/>
+          <p:nvPr/>
+        </p:nvCxnSpPr>
+        <p:spPr>
+          <a:xfrm flipH="1">
+            <a:off x="1570426" y="1254929"/>
+            <a:ext cx="286724" cy="0"/>
+          </a:xfrm>
+          <a:prstGeom prst="straightConnector1">
+            <a:avLst/>
+          </a:prstGeom>
+          <a:ln w="28575">
+            <a:solidFill>
+              <a:srgbClr val="FF0000"/>
+            </a:solidFill>
+            <a:tailEnd type="stealth" w="med" len="lg"/>
+          </a:ln>
+        </p:spPr>
+        <p:style>
+          <a:lnRef idx="1">
+            <a:schemeClr val="accent1"/>
+          </a:lnRef>
+          <a:fillRef idx="0">
+            <a:schemeClr val="accent1"/>
+          </a:fillRef>
+          <a:effectRef idx="0">
+            <a:schemeClr val="accent1"/>
+          </a:effectRef>
+          <a:fontRef idx="minor">
+            <a:schemeClr val="tx1"/>
+          </a:fontRef>
+        </p:style>
+      </p:cxnSp>
+      <p:sp>
+        <p:nvSpPr>
+          <p:cNvPr id="19" name="ZoneTexte 18"/>
+          <p:cNvSpPr txBox="1"/>
+          <p:nvPr/>
+        </p:nvSpPr>
+        <p:spPr>
+          <a:xfrm>
+            <a:off x="1857090" y="1070263"/>
+            <a:ext cx="2570960" cy="338554"/>
+          </a:xfrm>
+          <a:prstGeom prst="rect">
+            <a:avLst/>
+          </a:prstGeom>
+          <a:noFill/>
+        </p:spPr>
+        <p:txBody>
+          <a:bodyPr wrap="none" rtlCol="0">
+            <a:spAutoFit/>
+          </a:bodyPr>
+          <a:lstStyle/>
+          <a:p>
+            <a:r>
+              <a:rPr lang="fr-FR" sz="1600" b="1" smtClean="0">
+                <a:solidFill>
+                  <a:srgbClr val="FF0000"/>
+                </a:solidFill>
+              </a:rPr>
+              <a:t>Programme principal (main)</a:t>
+            </a:r>
+            <a:endParaRPr lang="fr-FR" sz="1600" b="1" dirty="0">
+              <a:solidFill>
+                <a:srgbClr val="FF0000"/>
+              </a:solidFill>
+            </a:endParaRPr>
+          </a:p>
+        </p:txBody>
+      </p:sp>
+      <p:sp>
+        <p:nvSpPr>
+          <p:cNvPr id="21" name="Rectangle 20"/>
+          <p:cNvSpPr/>
+          <p:nvPr/>
+        </p:nvSpPr>
+        <p:spPr>
+          <a:xfrm>
+            <a:off x="-1122570" y="3644494"/>
+            <a:ext cx="5357291" cy="215984"/>
+          </a:xfrm>
+          <a:prstGeom prst="rect">
+            <a:avLst/>
+          </a:prstGeom>
+          <a:noFill/>
+          <a:ln>
+            <a:solidFill>
+              <a:srgbClr val="00B050"/>
+            </a:solidFill>
+            <a:prstDash val="dash"/>
+          </a:ln>
+        </p:spPr>
+        <p:style>
+          <a:lnRef idx="2">
+            <a:schemeClr val="accent1">
+              <a:shade val="50000"/>
+            </a:schemeClr>
+          </a:lnRef>
+          <a:fillRef idx="1">
+            <a:schemeClr val="accent1"/>
+          </a:fillRef>
+          <a:effectRef idx="0">
+            <a:schemeClr val="accent1"/>
+          </a:effectRef>
+          <a:fontRef idx="minor">
+            <a:schemeClr val="lt1"/>
+          </a:fontRef>
+        </p:style>
+        <p:txBody>
+          <a:bodyPr rtlCol="0" anchor="ctr"/>
+          <a:lstStyle/>
+          <a:p>
+            <a:pPr algn="ctr"/>
+            <a:endParaRPr lang="fr-FR" sz="1600"/>
+          </a:p>
+        </p:txBody>
+      </p:sp>
+      <p:cxnSp>
+        <p:nvCxnSpPr>
+          <p:cNvPr id="22" name="Connecteur droit avec flèche 21"/>
+          <p:cNvCxnSpPr/>
+          <p:nvPr/>
+        </p:nvCxnSpPr>
+        <p:spPr>
+          <a:xfrm flipV="1">
+            <a:off x="-468560" y="3861048"/>
+            <a:ext cx="0" cy="220493"/>
+          </a:xfrm>
+          <a:prstGeom prst="straightConnector1">
+            <a:avLst/>
+          </a:prstGeom>
+          <a:ln w="28575">
+            <a:solidFill>
+              <a:srgbClr val="00B050"/>
+            </a:solidFill>
+            <a:tailEnd type="stealth" w="med" len="lg"/>
+          </a:ln>
+        </p:spPr>
+        <p:style>
+          <a:lnRef idx="1">
+            <a:schemeClr val="accent1"/>
+          </a:lnRef>
+          <a:fillRef idx="0">
+            <a:schemeClr val="accent1"/>
+          </a:fillRef>
+          <a:effectRef idx="0">
+            <a:schemeClr val="accent1"/>
+          </a:effectRef>
+          <a:fontRef idx="minor">
+            <a:schemeClr val="tx1"/>
+          </a:fontRef>
+        </p:style>
+      </p:cxnSp>
+      <p:pic>
+        <p:nvPicPr>
+          <p:cNvPr id="1029" name="Picture 5"/>
+          <p:cNvPicPr>
+            <a:picLocks noChangeAspect="1" noChangeArrowheads="1"/>
+          </p:cNvPicPr>
+          <p:nvPr/>
+        </p:nvPicPr>
+        <p:blipFill rotWithShape="1">
+          <a:blip r:embed="rId4">
+            <a:extLst>
+              <a:ext uri="{28A0092B-C50C-407E-A947-70E740481C1C}">
+                <a14:useLocalDpi xmlns:a14="http://schemas.microsoft.com/office/drawing/2010/main" val="0"/>
+              </a:ext>
+            </a:extLst>
+          </a:blip>
+          <a:srcRect t="28539" r="58008" b="27532"/>
+          <a:stretch/>
+        </p:blipFill>
+        <p:spPr bwMode="auto">
+          <a:xfrm>
+            <a:off x="2803042" y="2403813"/>
+            <a:ext cx="5463683" cy="3213506"/>
+          </a:xfrm>
+          <a:prstGeom prst="rect">
+            <a:avLst/>
+          </a:prstGeom>
+          <a:noFill/>
+          <a:ln>
+            <a:noFill/>
+          </a:ln>
+          <a:effectLst/>
+          <a:extLst>
+            <a:ext uri="{909E8E84-426E-40DD-AFC4-6F175D3DCCD1}">
+              <a14:hiddenFill xmlns:a14="http://schemas.microsoft.com/office/drawing/2010/main">
+                <a:solidFill>
+                  <a:schemeClr val="accent1"/>
+                </a:solidFill>
+              </a14:hiddenFill>
+            </a:ext>
+            <a:ext uri="{91240B29-F687-4F45-9708-019B960494DF}">
+              <a14:hiddenLine xmlns:a14="http://schemas.microsoft.com/office/drawing/2010/main" w="9525">
+                <a:solidFill>
+                  <a:schemeClr val="tx1"/>
+                </a:solidFill>
+                <a:miter lim="800000"/>
+                <a:headEnd/>
+                <a:tailEnd/>
+              </a14:hiddenLine>
+            </a:ext>
+            <a:ext uri="{AF507438-7753-43E0-B8FC-AC1667EBCBE1}">
+              <a14:hiddenEffects xmlns:a14="http://schemas.microsoft.com/office/drawing/2010/main">
+                <a:effectLst>
+                  <a:outerShdw dist="35921" dir="2700000" algn="ctr" rotWithShape="0">
+                    <a:schemeClr val="bg2"/>
+                  </a:outerShdw>
+                </a:effectLst>
+              </a14:hiddenEffects>
+            </a:ext>
+          </a:extLst>
+        </p:spPr>
+      </p:pic>
+      <p:sp>
+        <p:nvSpPr>
+          <p:cNvPr id="25" name="Rectangle 24"/>
+          <p:cNvSpPr/>
+          <p:nvPr/>
+        </p:nvSpPr>
+        <p:spPr>
+          <a:xfrm>
+            <a:off x="3215788" y="3846490"/>
+            <a:ext cx="4637211" cy="280506"/>
+          </a:xfrm>
+          <a:prstGeom prst="rect">
+            <a:avLst/>
+          </a:prstGeom>
+          <a:noFill/>
+          <a:ln>
+            <a:solidFill>
+              <a:srgbClr val="002060"/>
+            </a:solidFill>
+            <a:prstDash val="dash"/>
+          </a:ln>
+        </p:spPr>
+        <p:style>
+          <a:lnRef idx="2">
+            <a:schemeClr val="accent1">
+              <a:shade val="50000"/>
+            </a:schemeClr>
+          </a:lnRef>
+          <a:fillRef idx="1">
+            <a:schemeClr val="accent1"/>
+          </a:fillRef>
+          <a:effectRef idx="0">
+            <a:schemeClr val="accent1"/>
+          </a:effectRef>
+          <a:fontRef idx="minor">
+            <a:schemeClr val="lt1"/>
+          </a:fontRef>
+        </p:style>
+        <p:txBody>
+          <a:bodyPr rtlCol="0" anchor="ctr"/>
+          <a:lstStyle/>
+          <a:p>
+            <a:pPr algn="ctr"/>
+            <a:endParaRPr lang="fr-FR" sz="1600"/>
+          </a:p>
+        </p:txBody>
+      </p:sp>
+      <p:sp>
+        <p:nvSpPr>
+          <p:cNvPr id="14" name="Rectangle 13"/>
+          <p:cNvSpPr/>
+          <p:nvPr/>
+        </p:nvSpPr>
+        <p:spPr>
+          <a:xfrm>
+            <a:off x="2785297" y="2061835"/>
+            <a:ext cx="2970102" cy="338554"/>
+          </a:xfrm>
+          <a:prstGeom prst="rect">
+            <a:avLst/>
+          </a:prstGeom>
+        </p:spPr>
+        <p:txBody>
+          <a:bodyPr wrap="square">
+            <a:spAutoFit/>
+          </a:bodyPr>
+          <a:lstStyle/>
+          <a:p>
+            <a:r>
+              <a:rPr lang="fr-FR" sz="1600" b="1" dirty="0" smtClean="0">
+                <a:solidFill>
+                  <a:srgbClr val="0070C0"/>
+                </a:solidFill>
+              </a:rPr>
+              <a:t>Bibliothèque </a:t>
+            </a:r>
+            <a:r>
+              <a:rPr lang="fr-FR" sz="1600" b="1" i="1" dirty="0" err="1">
+                <a:solidFill>
+                  <a:srgbClr val="0070C0"/>
+                </a:solidFill>
+              </a:rPr>
+              <a:t>biblio_rugosite</a:t>
+            </a:r>
+            <a:endParaRPr lang="fr-FR" sz="1600" b="1" i="1" dirty="0">
+              <a:solidFill>
+                <a:srgbClr val="0070C0"/>
+              </a:solidFill>
+            </a:endParaRPr>
+          </a:p>
+        </p:txBody>
+      </p:sp>
+      <p:sp>
+        <p:nvSpPr>
+          <p:cNvPr id="32" name="Rectangle 31"/>
+          <p:cNvSpPr/>
+          <p:nvPr/>
+        </p:nvSpPr>
+        <p:spPr>
+          <a:xfrm>
+            <a:off x="4977935" y="3522494"/>
+            <a:ext cx="3624241" cy="338554"/>
+          </a:xfrm>
+          <a:prstGeom prst="rect">
+            <a:avLst/>
+          </a:prstGeom>
+        </p:spPr>
+        <p:txBody>
+          <a:bodyPr wrap="square">
+            <a:spAutoFit/>
+          </a:bodyPr>
+          <a:lstStyle/>
+          <a:p>
+            <a:r>
+              <a:rPr lang="fr-FR" sz="1600" b="1" dirty="0" smtClean="0">
+                <a:solidFill>
+                  <a:srgbClr val="002060"/>
+                </a:solidFill>
+              </a:rPr>
+              <a:t>Signature de la fonction </a:t>
+            </a:r>
+            <a:r>
+              <a:rPr lang="fr-FR" sz="1600" b="1" i="1" dirty="0" err="1" smtClean="0">
+                <a:solidFill>
+                  <a:srgbClr val="002060"/>
+                </a:solidFill>
+              </a:rPr>
+              <a:t>generate_profil</a:t>
+            </a:r>
+            <a:endParaRPr lang="fr-FR" sz="1600" b="1" i="1" dirty="0">
+              <a:solidFill>
+                <a:srgbClr val="002060"/>
+              </a:solidFill>
+            </a:endParaRPr>
+          </a:p>
+        </p:txBody>
+      </p:sp>
+      <p:cxnSp>
+        <p:nvCxnSpPr>
+          <p:cNvPr id="24" name="Connecteur droit 23"/>
+          <p:cNvCxnSpPr/>
+          <p:nvPr/>
+        </p:nvCxnSpPr>
+        <p:spPr>
+          <a:xfrm>
+            <a:off x="3431812" y="4189469"/>
+            <a:ext cx="0" cy="1255377"/>
+          </a:xfrm>
+          <a:prstGeom prst="line">
+            <a:avLst/>
+          </a:prstGeom>
+          <a:noFill/>
+          <a:ln>
+            <a:solidFill>
+              <a:srgbClr val="002060"/>
+            </a:solidFill>
+            <a:prstDash val="dash"/>
+          </a:ln>
+        </p:spPr>
+        <p:style>
+          <a:lnRef idx="2">
+            <a:schemeClr val="accent1">
+              <a:shade val="50000"/>
+            </a:schemeClr>
+          </a:lnRef>
+          <a:fillRef idx="1">
+            <a:schemeClr val="accent1"/>
+          </a:fillRef>
+          <a:effectRef idx="0">
+            <a:schemeClr val="accent1"/>
+          </a:effectRef>
+          <a:fontRef idx="minor">
+            <a:schemeClr val="lt1"/>
+          </a:fontRef>
+        </p:style>
+      </p:cxnSp>
+      <p:sp>
+        <p:nvSpPr>
+          <p:cNvPr id="37" name="Rectangle 36"/>
+          <p:cNvSpPr/>
+          <p:nvPr/>
+        </p:nvSpPr>
+        <p:spPr>
+          <a:xfrm>
+            <a:off x="1832023" y="4321298"/>
+            <a:ext cx="1659857" cy="830997"/>
+          </a:xfrm>
+          <a:prstGeom prst="rect">
+            <a:avLst/>
+          </a:prstGeom>
+        </p:spPr>
+        <p:txBody>
+          <a:bodyPr wrap="square">
+            <a:spAutoFit/>
+          </a:bodyPr>
+          <a:lstStyle/>
+          <a:p>
+            <a:pPr algn="r"/>
+            <a:r>
+              <a:rPr lang="fr-FR" sz="1600" b="1" dirty="0" smtClean="0">
+                <a:solidFill>
+                  <a:srgbClr val="002060"/>
+                </a:solidFill>
+              </a:rPr>
+              <a:t>Spécifications de la fonction </a:t>
+            </a:r>
+            <a:r>
+              <a:rPr lang="fr-FR" sz="1600" b="1" i="1" dirty="0" err="1" smtClean="0">
+                <a:solidFill>
+                  <a:srgbClr val="002060"/>
+                </a:solidFill>
+              </a:rPr>
+              <a:t>generate_profil</a:t>
+            </a:r>
+            <a:endParaRPr lang="fr-FR" sz="1600" b="1" i="1" dirty="0">
+              <a:solidFill>
+                <a:srgbClr val="002060"/>
+              </a:solidFill>
+            </a:endParaRPr>
+          </a:p>
+        </p:txBody>
+      </p:sp>
+      <p:sp>
+        <p:nvSpPr>
+          <p:cNvPr id="23" name="ZoneTexte 22"/>
+          <p:cNvSpPr txBox="1"/>
+          <p:nvPr/>
+        </p:nvSpPr>
+        <p:spPr>
+          <a:xfrm>
+            <a:off x="-1511381" y="4009646"/>
+            <a:ext cx="2596993" cy="584775"/>
+          </a:xfrm>
+          <a:prstGeom prst="rect">
+            <a:avLst/>
+          </a:prstGeom>
+          <a:solidFill>
+            <a:schemeClr val="bg1">
+              <a:alpha val="70000"/>
+            </a:schemeClr>
+          </a:solidFill>
+        </p:spPr>
+        <p:txBody>
+          <a:bodyPr wrap="none" rtlCol="0">
+            <a:spAutoFit/>
+          </a:bodyPr>
+          <a:lstStyle/>
+          <a:p>
+            <a:r>
+              <a:rPr lang="fr-FR" sz="1600" b="1" dirty="0" smtClean="0">
+                <a:solidFill>
+                  <a:srgbClr val="00B050"/>
+                </a:solidFill>
+              </a:rPr>
+              <a:t>Appel d’une fonction de la </a:t>
+            </a:r>
+          </a:p>
+          <a:p>
+            <a:r>
+              <a:rPr lang="fr-FR" sz="1600" b="1" dirty="0" smtClean="0">
+                <a:solidFill>
+                  <a:srgbClr val="00B050"/>
+                </a:solidFill>
+              </a:rPr>
+              <a:t>bibliothèque </a:t>
+            </a:r>
+            <a:r>
+              <a:rPr lang="fr-FR" sz="1600" b="1" i="1" dirty="0" err="1" smtClean="0">
+                <a:solidFill>
+                  <a:srgbClr val="00B050"/>
+                </a:solidFill>
+              </a:rPr>
+              <a:t>biblio_rugosite</a:t>
+            </a:r>
+            <a:endParaRPr lang="fr-FR" sz="1600" b="1" i="1" dirty="0">
+              <a:solidFill>
+                <a:srgbClr val="00B050"/>
+              </a:solidFill>
+            </a:endParaRPr>
+          </a:p>
+        </p:txBody>
+      </p:sp>
+      <p:sp>
+        <p:nvSpPr>
+          <p:cNvPr id="33" name="Rectangle 32"/>
+          <p:cNvSpPr/>
+          <p:nvPr/>
+        </p:nvSpPr>
+        <p:spPr>
+          <a:xfrm>
+            <a:off x="4756199" y="2403812"/>
+            <a:ext cx="1126750" cy="369040"/>
+          </a:xfrm>
+          <a:prstGeom prst="rect">
+            <a:avLst/>
+          </a:prstGeom>
+          <a:solidFill>
+            <a:schemeClr val="bg1">
+              <a:alpha val="70000"/>
+            </a:schemeClr>
+          </a:solidFill>
+          <a:ln>
+            <a:noFill/>
+          </a:ln>
+        </p:spPr>
+        <p:style>
+          <a:lnRef idx="2">
+            <a:schemeClr val="accent1">
+              <a:shade val="50000"/>
+            </a:schemeClr>
+          </a:lnRef>
+          <a:fillRef idx="1">
+            <a:schemeClr val="accent1"/>
+          </a:fillRef>
+          <a:effectRef idx="0">
+            <a:schemeClr val="accent1"/>
+          </a:effectRef>
+          <a:fontRef idx="minor">
+            <a:schemeClr val="lt1"/>
+          </a:fontRef>
+        </p:style>
+        <p:txBody>
+          <a:bodyPr rtlCol="0" anchor="ctr"/>
+          <a:lstStyle/>
+          <a:p>
+            <a:pPr algn="ctr"/>
+            <a:endParaRPr lang="fr-FR"/>
+          </a:p>
+        </p:txBody>
+      </p:sp>
+      <p:sp>
+        <p:nvSpPr>
+          <p:cNvPr id="34" name="Rectangle 33"/>
+          <p:cNvSpPr/>
+          <p:nvPr/>
+        </p:nvSpPr>
+        <p:spPr>
+          <a:xfrm>
+            <a:off x="2803534" y="2335954"/>
+            <a:ext cx="832362" cy="474977"/>
+          </a:xfrm>
+          <a:prstGeom prst="rect">
+            <a:avLst/>
+          </a:prstGeom>
+          <a:solidFill>
+            <a:schemeClr val="bg1">
+              <a:alpha val="70000"/>
+            </a:schemeClr>
+          </a:solidFill>
+          <a:ln>
+            <a:noFill/>
+          </a:ln>
+        </p:spPr>
+        <p:style>
+          <a:lnRef idx="2">
+            <a:schemeClr val="accent1">
+              <a:shade val="50000"/>
+            </a:schemeClr>
+          </a:lnRef>
+          <a:fillRef idx="1">
+            <a:schemeClr val="accent1"/>
+          </a:fillRef>
+          <a:effectRef idx="0">
+            <a:schemeClr val="accent1"/>
+          </a:effectRef>
+          <a:fontRef idx="minor">
+            <a:schemeClr val="lt1"/>
+          </a:fontRef>
+        </p:style>
+        <p:txBody>
+          <a:bodyPr rtlCol="0" anchor="ctr"/>
+          <a:lstStyle/>
+          <a:p>
+            <a:pPr algn="ctr"/>
+            <a:endParaRPr lang="fr-FR"/>
+          </a:p>
+        </p:txBody>
+      </p:sp>
+      <p:sp>
+        <p:nvSpPr>
+          <p:cNvPr id="30" name="Rectangle 29"/>
+          <p:cNvSpPr/>
+          <p:nvPr/>
+        </p:nvSpPr>
+        <p:spPr>
+          <a:xfrm>
+            <a:off x="2803042" y="2384376"/>
+            <a:ext cx="5701453" cy="3232943"/>
+          </a:xfrm>
+          <a:prstGeom prst="rect">
+            <a:avLst/>
+          </a:prstGeom>
+          <a:noFill/>
+          <a:ln>
+            <a:solidFill>
+              <a:srgbClr val="0070C0"/>
+            </a:solidFill>
+            <a:prstDash val="dash"/>
+          </a:ln>
+        </p:spPr>
+        <p:style>
+          <a:lnRef idx="2">
+            <a:schemeClr val="accent1">
+              <a:shade val="50000"/>
+            </a:schemeClr>
+          </a:lnRef>
+          <a:fillRef idx="1">
+            <a:schemeClr val="accent1"/>
+          </a:fillRef>
+          <a:effectRef idx="0">
+            <a:schemeClr val="accent1"/>
+          </a:effectRef>
+          <a:fontRef idx="minor">
+            <a:schemeClr val="lt1"/>
+          </a:fontRef>
+        </p:style>
+        <p:txBody>
+          <a:bodyPr rtlCol="0" anchor="ctr"/>
+          <a:lstStyle/>
+          <a:p>
+            <a:pPr algn="ctr"/>
+            <a:endParaRPr lang="fr-FR" sz="1600"/>
+          </a:p>
+        </p:txBody>
+      </p:sp>
+      <p:cxnSp>
+        <p:nvCxnSpPr>
+          <p:cNvPr id="36" name="Connecteur droit avec flèche 35"/>
+          <p:cNvCxnSpPr/>
+          <p:nvPr/>
+        </p:nvCxnSpPr>
+        <p:spPr>
+          <a:xfrm flipH="1" flipV="1">
+            <a:off x="1085612" y="3060885"/>
+            <a:ext cx="1717430" cy="584110"/>
+          </a:xfrm>
+          <a:prstGeom prst="straightConnector1">
+            <a:avLst/>
+          </a:prstGeom>
+          <a:noFill/>
+          <a:ln>
+            <a:solidFill>
+              <a:srgbClr val="0070C0"/>
+            </a:solidFill>
+            <a:prstDash val="dash"/>
+          </a:ln>
+        </p:spPr>
+        <p:style>
+          <a:lnRef idx="2">
+            <a:schemeClr val="accent1">
+              <a:shade val="50000"/>
+            </a:schemeClr>
+          </a:lnRef>
+          <a:fillRef idx="1">
+            <a:schemeClr val="accent1"/>
+          </a:fillRef>
+          <a:effectRef idx="0">
+            <a:schemeClr val="accent1"/>
+          </a:effectRef>
+          <a:fontRef idx="minor">
+            <a:schemeClr val="lt1"/>
+          </a:fontRef>
+        </p:style>
+      </p:cxnSp>
+      <p:cxnSp>
+        <p:nvCxnSpPr>
+          <p:cNvPr id="44" name="Connecteur droit avec flèche 43"/>
+          <p:cNvCxnSpPr/>
+          <p:nvPr/>
+        </p:nvCxnSpPr>
+        <p:spPr>
+          <a:xfrm flipH="1">
+            <a:off x="-1097856" y="2403813"/>
+            <a:ext cx="3901390" cy="407118"/>
+          </a:xfrm>
+          <a:prstGeom prst="straightConnector1">
+            <a:avLst/>
+          </a:prstGeom>
+          <a:noFill/>
+          <a:ln>
+            <a:solidFill>
+              <a:srgbClr val="0070C0"/>
+            </a:solidFill>
+            <a:prstDash val="dash"/>
+          </a:ln>
+        </p:spPr>
+        <p:style>
+          <a:lnRef idx="2">
+            <a:schemeClr val="accent1">
+              <a:shade val="50000"/>
+            </a:schemeClr>
+          </a:lnRef>
+          <a:fillRef idx="1">
+            <a:schemeClr val="accent1"/>
+          </a:fillRef>
+          <a:effectRef idx="0">
+            <a:schemeClr val="accent1"/>
+          </a:effectRef>
+          <a:fontRef idx="minor">
+            <a:schemeClr val="lt1"/>
+          </a:fontRef>
+        </p:style>
+      </p:cxnSp>
+      <p:cxnSp>
+        <p:nvCxnSpPr>
+          <p:cNvPr id="47" name="Connecteur droit avec flèche 46"/>
+          <p:cNvCxnSpPr/>
+          <p:nvPr/>
+        </p:nvCxnSpPr>
+        <p:spPr>
+          <a:xfrm>
+            <a:off x="-1097855" y="3060884"/>
+            <a:ext cx="3900897" cy="2556435"/>
+          </a:xfrm>
+          <a:prstGeom prst="straightConnector1">
+            <a:avLst/>
+          </a:prstGeom>
+          <a:noFill/>
+          <a:ln>
+            <a:solidFill>
+              <a:srgbClr val="0070C0"/>
+            </a:solidFill>
+            <a:prstDash val="dash"/>
+          </a:ln>
+        </p:spPr>
+        <p:style>
+          <a:lnRef idx="2">
+            <a:schemeClr val="accent1">
+              <a:shade val="50000"/>
+            </a:schemeClr>
+          </a:lnRef>
+          <a:fillRef idx="1">
+            <a:schemeClr val="accent1"/>
+          </a:fillRef>
+          <a:effectRef idx="0">
+            <a:schemeClr val="accent1"/>
+          </a:effectRef>
+          <a:fontRef idx="minor">
+            <a:schemeClr val="lt1"/>
+          </a:fontRef>
+        </p:style>
+      </p:cxnSp>
+    </p:spTree>
+    <p:extLst>
+      <p:ext uri="{BB962C8B-B14F-4D97-AF65-F5344CB8AC3E}">
+        <p14:creationId xmlns:p14="http://schemas.microsoft.com/office/powerpoint/2010/main" val="500365818"/>
+      </p:ext>
+    </p:extLst>
+  </p:cSld>
+  <p:clrMapOvr>
+    <a:masterClrMapping/>
+  </p:clrMapOvr>
+</p:sld>
+</file>
+
 <file path=ppt/theme/theme1.xml><?xml version="1.0" encoding="utf-8"?>
 <a:theme xmlns:a="http://schemas.openxmlformats.org/drawingml/2006/main" name="Thème Office">
   <a:themeElements>
@@ -4231,4 +5787,289 @@
   <a:objectDefaults/>
   <a:extraClrSchemeLst/>
 </a:theme>
+</file>
+
+<file path=ppt/theme/theme2.xml><?xml version="1.0" encoding="utf-8"?>
+<a:theme xmlns:a="http://schemas.openxmlformats.org/drawingml/2006/main" name="Thème Office">
+  <a:themeElements>
+    <a:clrScheme name="Office">
+      <a:dk1>
+        <a:sysClr val="windowText" lastClr="000000"/>
+      </a:dk1>
+      <a:lt1>
+        <a:sysClr val="window" lastClr="FFFFFF"/>
+      </a:lt1>
+      <a:dk2>
+        <a:srgbClr val="1F497D"/>
+      </a:dk2>
+      <a:lt2>
+        <a:srgbClr val="EEECE1"/>
+      </a:lt2>
+      <a:accent1>
+        <a:srgbClr val="4F81BD"/>
+      </a:accent1>
+      <a:accent2>
+        <a:srgbClr val="C0504D"/>
+      </a:accent2>
+      <a:accent3>
+        <a:srgbClr val="9BBB59"/>
+      </a:accent3>
+      <a:accent4>
+        <a:srgbClr val="8064A2"/>
+      </a:accent4>
+      <a:accent5>
+        <a:srgbClr val="4BACC6"/>
+      </a:accent5>
+      <a:accent6>
+        <a:srgbClr val="F79646"/>
+      </a:accent6>
+      <a:hlink>
+        <a:srgbClr val="0000FF"/>
+      </a:hlink>
+      <a:folHlink>
+        <a:srgbClr val="800080"/>
+      </a:folHlink>
+    </a:clrScheme>
+    <a:fontScheme name="Office">
+      <a:majorFont>
+        <a:latin typeface="Calibri"/>
+        <a:ea typeface=""/>
+        <a:cs typeface=""/>
+        <a:font script="Jpan" typeface="ＭＳ Ｐゴシック"/>
+        <a:font script="Hang" typeface="맑은 고딕"/>
+        <a:font script="Hans" typeface="宋体"/>
+        <a:font script="Hant" typeface="新細明體"/>
+        <a:font script="Arab" typeface="Times New Roman"/>
+        <a:font script="Hebr" typeface="Times New Roman"/>
+        <a:font script="Thai" typeface="Angsana New"/>
+        <a:font script="Ethi" typeface="Nyala"/>
+        <a:font script="Beng" typeface="Vrinda"/>
+        <a:font script="Gujr" typeface="Shruti"/>
+        <a:font script="Khmr" typeface="MoolBoran"/>
+        <a:font script="Knda" typeface="Tunga"/>
+        <a:font script="Guru" typeface="Raavi"/>
+        <a:font script="Cans" typeface="Euphemia"/>
+        <a:font script="Cher" typeface="Plantagenet Cherokee"/>
+        <a:font script="Yiii" typeface="Microsoft Yi Baiti"/>
+        <a:font script="Tibt" typeface="Microsoft Himalaya"/>
+        <a:font script="Thaa" typeface="MV Boli"/>
+        <a:font script="Deva" typeface="Mangal"/>
+        <a:font script="Telu" typeface="Gautami"/>
+        <a:font script="Taml" typeface="Latha"/>
+        <a:font script="Syrc" typeface="Estrangelo Edessa"/>
+        <a:font script="Orya" typeface="Kalinga"/>
+        <a:font script="Mlym" typeface="Kartika"/>
+        <a:font script="Laoo" typeface="DokChampa"/>
+        <a:font script="Sinh" typeface="Iskoola Pota"/>
+        <a:font script="Mong" typeface="Mongolian Baiti"/>
+        <a:font script="Viet" typeface="Times New Roman"/>
+        <a:font script="Uigh" typeface="Microsoft Uighur"/>
+        <a:font script="Geor" typeface="Sylfaen"/>
+      </a:majorFont>
+      <a:minorFont>
+        <a:latin typeface="Calibri"/>
+        <a:ea typeface=""/>
+        <a:cs typeface=""/>
+        <a:font script="Jpan" typeface="ＭＳ Ｐゴシック"/>
+        <a:font script="Hang" typeface="맑은 고딕"/>
+        <a:font script="Hans" typeface="宋体"/>
+        <a:font script="Hant" typeface="新細明體"/>
+        <a:font script="Arab" typeface="Arial"/>
+        <a:font script="Hebr" typeface="Arial"/>
+        <a:font script="Thai" typeface="Cordia New"/>
+        <a:font script="Ethi" typeface="Nyala"/>
+        <a:font script="Beng" typeface="Vrinda"/>
+        <a:font script="Gujr" typeface="Shruti"/>
+        <a:font script="Khmr" typeface="DaunPenh"/>
+        <a:font script="Knda" typeface="Tunga"/>
+        <a:font script="Guru" typeface="Raavi"/>
+        <a:font script="Cans" typeface="Euphemia"/>
+        <a:font script="Cher" typeface="Plantagenet Cherokee"/>
+        <a:font script="Yiii" typeface="Microsoft Yi Baiti"/>
+        <a:font script="Tibt" typeface="Microsoft Himalaya"/>
+        <a:font script="Thaa" typeface="MV Boli"/>
+        <a:font script="Deva" typeface="Mangal"/>
+        <a:font script="Telu" typeface="Gautami"/>
+        <a:font script="Taml" typeface="Latha"/>
+        <a:font script="Syrc" typeface="Estrangelo Edessa"/>
+        <a:font script="Orya" typeface="Kalinga"/>
+        <a:font script="Mlym" typeface="Kartika"/>
+        <a:font script="Laoo" typeface="DokChampa"/>
+        <a:font script="Sinh" typeface="Iskoola Pota"/>
+        <a:font script="Mong" typeface="Mongolian Baiti"/>
+        <a:font script="Viet" typeface="Arial"/>
+        <a:font script="Uigh" typeface="Microsoft Uighur"/>
+        <a:font script="Geor" typeface="Sylfaen"/>
+      </a:minorFont>
+    </a:fontScheme>
+    <a:fmtScheme name="Office">
+      <a:fillStyleLst>
+        <a:solidFill>
+          <a:schemeClr val="phClr"/>
+        </a:solidFill>
+        <a:gradFill rotWithShape="1">
+          <a:gsLst>
+            <a:gs pos="0">
+              <a:schemeClr val="phClr">
+                <a:tint val="50000"/>
+                <a:satMod val="300000"/>
+              </a:schemeClr>
+            </a:gs>
+            <a:gs pos="35000">
+              <a:schemeClr val="phClr">
+                <a:tint val="37000"/>
+                <a:satMod val="300000"/>
+              </a:schemeClr>
+            </a:gs>
+            <a:gs pos="100000">
+              <a:schemeClr val="phClr">
+                <a:tint val="15000"/>
+                <a:satMod val="350000"/>
+              </a:schemeClr>
+            </a:gs>
+          </a:gsLst>
+          <a:lin ang="16200000" scaled="1"/>
+        </a:gradFill>
+        <a:gradFill rotWithShape="1">
+          <a:gsLst>
+            <a:gs pos="0">
+              <a:schemeClr val="phClr">
+                <a:shade val="51000"/>
+                <a:satMod val="130000"/>
+              </a:schemeClr>
+            </a:gs>
+            <a:gs pos="80000">
+              <a:schemeClr val="phClr">
+                <a:shade val="93000"/>
+                <a:satMod val="130000"/>
+              </a:schemeClr>
+            </a:gs>
+            <a:gs pos="100000">
+              <a:schemeClr val="phClr">
+                <a:shade val="94000"/>
+                <a:satMod val="135000"/>
+              </a:schemeClr>
+            </a:gs>
+          </a:gsLst>
+          <a:lin ang="16200000" scaled="0"/>
+        </a:gradFill>
+      </a:fillStyleLst>
+      <a:lnStyleLst>
+        <a:ln w="9525" cap="flat" cmpd="sng" algn="ctr">
+          <a:solidFill>
+            <a:schemeClr val="phClr">
+              <a:shade val="95000"/>
+              <a:satMod val="105000"/>
+            </a:schemeClr>
+          </a:solidFill>
+          <a:prstDash val="solid"/>
+        </a:ln>
+        <a:ln w="25400" cap="flat" cmpd="sng" algn="ctr">
+          <a:solidFill>
+            <a:schemeClr val="phClr"/>
+          </a:solidFill>
+          <a:prstDash val="solid"/>
+        </a:ln>
+        <a:ln w="38100" cap="flat" cmpd="sng" algn="ctr">
+          <a:solidFill>
+            <a:schemeClr val="phClr"/>
+          </a:solidFill>
+          <a:prstDash val="solid"/>
+        </a:ln>
+      </a:lnStyleLst>
+      <a:effectStyleLst>
+        <a:effectStyle>
+          <a:effectLst>
+            <a:outerShdw blurRad="40000" dist="20000" dir="5400000" rotWithShape="0">
+              <a:srgbClr val="000000">
+                <a:alpha val="38000"/>
+              </a:srgbClr>
+            </a:outerShdw>
+          </a:effectLst>
+        </a:effectStyle>
+        <a:effectStyle>
+          <a:effectLst>
+            <a:outerShdw blurRad="40000" dist="23000" dir="5400000" rotWithShape="0">
+              <a:srgbClr val="000000">
+                <a:alpha val="35000"/>
+              </a:srgbClr>
+            </a:outerShdw>
+          </a:effectLst>
+        </a:effectStyle>
+        <a:effectStyle>
+          <a:effectLst>
+            <a:outerShdw blurRad="40000" dist="23000" dir="5400000" rotWithShape="0">
+              <a:srgbClr val="000000">
+                <a:alpha val="35000"/>
+              </a:srgbClr>
+            </a:outerShdw>
+          </a:effectLst>
+          <a:scene3d>
+            <a:camera prst="orthographicFront">
+              <a:rot lat="0" lon="0" rev="0"/>
+            </a:camera>
+            <a:lightRig rig="threePt" dir="t">
+              <a:rot lat="0" lon="0" rev="1200000"/>
+            </a:lightRig>
+          </a:scene3d>
+          <a:sp3d>
+            <a:bevelT w="63500" h="25400"/>
+          </a:sp3d>
+        </a:effectStyle>
+      </a:effectStyleLst>
+      <a:bgFillStyleLst>
+        <a:solidFill>
+          <a:schemeClr val="phClr"/>
+        </a:solidFill>
+        <a:gradFill rotWithShape="1">
+          <a:gsLst>
+            <a:gs pos="0">
+              <a:schemeClr val="phClr">
+                <a:tint val="40000"/>
+                <a:satMod val="350000"/>
+              </a:schemeClr>
+            </a:gs>
+            <a:gs pos="40000">
+              <a:schemeClr val="phClr">
+                <a:tint val="45000"/>
+                <a:shade val="99000"/>
+                <a:satMod val="350000"/>
+              </a:schemeClr>
+            </a:gs>
+            <a:gs pos="100000">
+              <a:schemeClr val="phClr">
+                <a:shade val="20000"/>
+                <a:satMod val="255000"/>
+              </a:schemeClr>
+            </a:gs>
+          </a:gsLst>
+          <a:path path="circle">
+            <a:fillToRect l="50000" t="-80000" r="50000" b="180000"/>
+          </a:path>
+        </a:gradFill>
+        <a:gradFill rotWithShape="1">
+          <a:gsLst>
+            <a:gs pos="0">
+              <a:schemeClr val="phClr">
+                <a:tint val="80000"/>
+                <a:satMod val="300000"/>
+              </a:schemeClr>
+            </a:gs>
+            <a:gs pos="100000">
+              <a:schemeClr val="phClr">
+                <a:shade val="30000"/>
+                <a:satMod val="200000"/>
+              </a:schemeClr>
+            </a:gs>
+          </a:gsLst>
+          <a:path path="circle">
+            <a:fillToRect l="50000" t="50000" r="50000" b="50000"/>
+          </a:path>
+        </a:gradFill>
+      </a:bgFillStyleLst>
+    </a:fmtScheme>
+  </a:themeElements>
+  <a:objectDefaults/>
+  <a:extraClrSchemeLst/>
+</a:theme>
 </file>
</xml_diff>